<commit_message>
Cada vez que olho, mais uma mudança é feita
</commit_message>
<xml_diff>
--- a/Apresentacao_Editado.pptx
+++ b/Apresentacao_Editado.pptx
@@ -3475,34 +3475,34 @@
           <a:lstStyle/>
           <a:p>
             <a:r>
-              <a:rPr sz="4400" dirty="0" err="1"/>
+              <a:rPr sz="4000" dirty="0" err="1"/>
               <a:t>Modelagem</a:t>
             </a:r>
             <a:r>
-              <a:rPr sz="4400" dirty="0"/>
+              <a:rPr sz="4000" dirty="0"/>
               <a:t> </a:t>
             </a:r>
             <a:r>
-              <a:rPr sz="4400" dirty="0" err="1"/>
+              <a:rPr sz="4000" dirty="0" err="1"/>
               <a:t>Conjunta</a:t>
             </a:r>
             <a:r>
-              <a:rPr sz="4400" dirty="0"/>
+              <a:rPr sz="4000" dirty="0"/>
               <a:t> de Dados </a:t>
             </a:r>
             <a:r>
-              <a:rPr sz="4400" dirty="0" err="1"/>
+              <a:rPr sz="4000" dirty="0" err="1"/>
               <a:t>Longitudinais</a:t>
             </a:r>
             <a:r>
-              <a:rPr sz="4400" dirty="0"/>
+              <a:rPr sz="4000" dirty="0"/>
               <a:t> e de </a:t>
             </a:r>
             <a:r>
-              <a:rPr sz="4400" dirty="0" err="1"/>
+              <a:rPr sz="4000" dirty="0" err="1"/>
               <a:t>Sobrevivência</a:t>
             </a:r>
-            <a:endParaRPr sz="4400" dirty="0"/>
+            <a:endParaRPr sz="4000" dirty="0"/>
           </a:p>
         </p:txBody>
       </p:sp>
@@ -3582,11 +3582,11 @@
           <a:p>
             <a:pPr algn="ctr"/>
             <a:r>
-              <a:rPr lang="pt-BR" dirty="0"/>
+              <a:rPr lang="pt-BR" sz="1100" dirty="0"/>
               <a:t>Universidade</a:t>
             </a:r>
             <a:r>
-              <a:rPr dirty="0"/>
+              <a:rPr sz="1100" dirty="0"/>
               <a:t> Federal de Minas Gerais (UFMG)</a:t>
             </a:r>
           </a:p>
@@ -3638,8 +3638,8 @@
           </a:p>
         </p:txBody>
       </p:sp>
-      <mc:AlternateContent xmlns:mc="http://schemas.openxmlformats.org/markup-compatibility/2006">
-        <mc:Choice xmlns:a14="http://schemas.microsoft.com/office/drawing/2010/main" Requires="a14">
+      <mc:AlternateContent xmlns:mc="http://schemas.openxmlformats.org/markup-compatibility/2006" xmlns:a14="http://schemas.microsoft.com/office/drawing/2010/main">
+        <mc:Choice Requires="a14">
           <p:sp>
             <p:nvSpPr>
               <p:cNvPr id="3" name="Content Placeholder 2"/>
@@ -4098,7 +4098,7 @@
             </p:txBody>
           </p:sp>
         </mc:Choice>
-        <mc:Fallback>
+        <mc:Fallback xmlns="">
           <p:sp>
             <p:nvSpPr>
               <p:cNvPr id="3" name="Content Placeholder 2"/>
@@ -4178,8 +4178,8 @@
           </a:p>
         </p:txBody>
       </p:sp>
-      <mc:AlternateContent xmlns:mc="http://schemas.openxmlformats.org/markup-compatibility/2006">
-        <mc:Choice xmlns:a14="http://schemas.microsoft.com/office/drawing/2010/main" Requires="a14">
+      <mc:AlternateContent xmlns:mc="http://schemas.openxmlformats.org/markup-compatibility/2006" xmlns:a14="http://schemas.microsoft.com/office/drawing/2010/main">
+        <mc:Choice Requires="a14">
           <p:sp>
             <p:nvSpPr>
               <p:cNvPr id="3" name="Content Placeholder 2"/>
@@ -4403,7 +4403,7 @@
             </p:txBody>
           </p:sp>
         </mc:Choice>
-        <mc:Fallback>
+        <mc:Fallback xmlns="">
           <p:sp>
             <p:nvSpPr>
               <p:cNvPr id="3" name="Content Placeholder 2"/>
@@ -4519,8 +4519,8 @@
           </a:p>
         </p:txBody>
       </p:sp>
-      <mc:AlternateContent xmlns:mc="http://schemas.openxmlformats.org/markup-compatibility/2006">
-        <mc:Choice xmlns:a14="http://schemas.microsoft.com/office/drawing/2010/main" Requires="a14">
+      <mc:AlternateContent xmlns:mc="http://schemas.openxmlformats.org/markup-compatibility/2006" xmlns:a14="http://schemas.microsoft.com/office/drawing/2010/main">
+        <mc:Choice Requires="a14">
           <p:sp>
             <p:nvSpPr>
               <p:cNvPr id="3" name="Content Placeholder 2"/>
@@ -5005,7 +5005,7 @@
             </p:txBody>
           </p:sp>
         </mc:Choice>
-        <mc:Fallback>
+        <mc:Fallback xmlns="">
           <p:sp>
             <p:nvSpPr>
               <p:cNvPr id="3" name="Content Placeholder 2"/>
@@ -5561,8 +5561,8 @@
           </a:p>
         </p:txBody>
       </p:sp>
-      <mc:AlternateContent xmlns:mc="http://schemas.openxmlformats.org/markup-compatibility/2006">
-        <mc:Choice xmlns:a14="http://schemas.microsoft.com/office/drawing/2010/main" Requires="a14">
+      <mc:AlternateContent xmlns:mc="http://schemas.openxmlformats.org/markup-compatibility/2006" xmlns:a14="http://schemas.microsoft.com/office/drawing/2010/main">
+        <mc:Choice Requires="a14">
           <p:sp>
             <p:nvSpPr>
               <p:cNvPr id="3" name="Content Placeholder 2"/>
@@ -5648,7 +5648,7 @@
             </p:txBody>
           </p:sp>
         </mc:Choice>
-        <mc:Fallback>
+        <mc:Fallback xmlns="">
           <p:sp>
             <p:nvSpPr>
               <p:cNvPr id="3" name="Content Placeholder 2"/>
@@ -5824,6 +5824,40 @@
           </a:ln>
         </p:spPr>
       </p:pic>
+      <p:sp>
+        <p:nvSpPr>
+          <p:cNvPr id="3" name="Title 1">
+            <a:extLst>
+              <a:ext uri="{FF2B5EF4-FFF2-40B4-BE49-F238E27FC236}">
+                <a16:creationId xmlns:a16="http://schemas.microsoft.com/office/drawing/2014/main" id="{40DA4988-7566-4FA4-9EED-BF91D39C44E6}"/>
+              </a:ext>
+            </a:extLst>
+          </p:cNvPr>
+          <p:cNvSpPr>
+            <a:spLocks noGrp="1"/>
+          </p:cNvSpPr>
+          <p:nvPr>
+            <p:ph type="title"/>
+          </p:nvPr>
+        </p:nvSpPr>
+        <p:spPr>
+          <a:xfrm>
+            <a:off x="1202919" y="284176"/>
+            <a:ext cx="9784080" cy="1508760"/>
+          </a:xfrm>
+        </p:spPr>
+        <p:txBody>
+          <a:bodyPr/>
+          <a:lstStyle/>
+          <a:p>
+            <a:r>
+              <a:rPr lang="pt-BR" dirty="0"/>
+              <a:t>ARTIGO</a:t>
+            </a:r>
+            <a:endParaRPr dirty="0"/>
+          </a:p>
+        </p:txBody>
+      </p:sp>
     </p:spTree>
   </p:cSld>
   <p:clrMapOvr>
@@ -6373,8 +6407,8 @@
           </a:p>
         </p:txBody>
       </p:sp>
-      <mc:AlternateContent xmlns:mc="http://schemas.openxmlformats.org/markup-compatibility/2006">
-        <mc:Choice xmlns:a14="http://schemas.microsoft.com/office/drawing/2010/main" Requires="a14">
+      <mc:AlternateContent xmlns:mc="http://schemas.openxmlformats.org/markup-compatibility/2006" xmlns:a14="http://schemas.microsoft.com/office/drawing/2010/main">
+        <mc:Choice Requires="a14">
           <p:sp>
             <p:nvSpPr>
               <p:cNvPr id="3" name="Content Placeholder 2"/>
@@ -6641,7 +6675,7 @@
             </p:txBody>
           </p:sp>
         </mc:Choice>
-        <mc:Fallback>
+        <mc:Fallback xmlns="">
           <p:sp>
             <p:nvSpPr>
               <p:cNvPr id="3" name="Content Placeholder 2"/>
@@ -6820,8 +6854,8 @@
           </a:p>
         </p:txBody>
       </p:sp>
-      <mc:AlternateContent xmlns:mc="http://schemas.openxmlformats.org/markup-compatibility/2006">
-        <mc:Choice xmlns:a14="http://schemas.microsoft.com/office/drawing/2010/main" Requires="a14">
+      <mc:AlternateContent xmlns:mc="http://schemas.openxmlformats.org/markup-compatibility/2006" xmlns:a14="http://schemas.microsoft.com/office/drawing/2010/main">
+        <mc:Choice Requires="a14">
           <p:sp>
             <p:nvSpPr>
               <p:cNvPr id="3" name="Content Placeholder 2"/>
@@ -6896,7 +6930,7 @@
                     <m:d>
                       <m:dPr>
                         <m:ctrlPr>
-                          <a:rPr lang="pt-BR">
+                          <a:rPr lang="pt-BR" i="1">
                             <a:latin typeface="Cambria Math" panose="02040503050406030204" pitchFamily="18" charset="0"/>
                           </a:rPr>
                         </m:ctrlPr>
@@ -6965,7 +6999,7 @@
                     <m:d>
                       <m:dPr>
                         <m:ctrlPr>
-                          <a:rPr lang="pt-BR">
+                          <a:rPr lang="pt-BR" i="1">
                             <a:latin typeface="Cambria Math" panose="02040503050406030204" pitchFamily="18" charset="0"/>
                           </a:rPr>
                         </m:ctrlPr>
@@ -7057,7 +7091,7 @@
                     <m:d>
                       <m:dPr>
                         <m:ctrlPr>
-                          <a:rPr lang="pt-BR">
+                          <a:rPr lang="pt-BR" i="1">
                             <a:latin typeface="Cambria Math" panose="02040503050406030204" pitchFamily="18" charset="0"/>
                           </a:rPr>
                         </m:ctrlPr>
@@ -7772,7 +7806,7 @@
             </p:txBody>
           </p:sp>
         </mc:Choice>
-        <mc:Fallback>
+        <mc:Fallback xmlns="">
           <p:sp>
             <p:nvSpPr>
               <p:cNvPr id="3" name="Content Placeholder 2"/>
@@ -7831,8 +7865,8 @@
           <a:chExt cx="0" cy="0"/>
         </a:xfrm>
       </p:grpSpPr>
-      <mc:AlternateContent xmlns:mc="http://schemas.openxmlformats.org/markup-compatibility/2006">
-        <mc:Choice xmlns:a14="http://schemas.microsoft.com/office/drawing/2010/main" Requires="a14">
+      <mc:AlternateContent xmlns:mc="http://schemas.openxmlformats.org/markup-compatibility/2006" xmlns:a14="http://schemas.microsoft.com/office/drawing/2010/main">
+        <mc:Choice Requires="a14">
           <p:sp>
             <p:nvSpPr>
               <p:cNvPr id="3" name="Content Placeholder 2"/>
@@ -8399,7 +8433,7 @@
             </p:txBody>
           </p:sp>
         </mc:Choice>
-        <mc:Fallback>
+        <mc:Fallback xmlns="">
           <p:sp>
             <p:nvSpPr>
               <p:cNvPr id="3" name="Content Placeholder 2"/>
@@ -8753,7 +8787,25 @@
                       <a:rPr>
                         <a:latin typeface="Cambria Math" panose="02040503050406030204" pitchFamily="18" charset="0"/>
                       </a:rPr>
-                      <m:t>)=0.25</m:t>
+                      <m:t>)=</m:t>
+                    </m:r>
+                    <m:r>
+                      <a:rPr>
+                        <a:latin typeface="Cambria Math" panose="02040503050406030204" pitchFamily="18" charset="0"/>
+                      </a:rPr>
+                      <m:t>0</m:t>
+                    </m:r>
+                    <m:r>
+                      <a:rPr>
+                        <a:latin typeface="Cambria Math" panose="02040503050406030204" pitchFamily="18" charset="0"/>
+                      </a:rPr>
+                      <m:t>.</m:t>
+                    </m:r>
+                    <m:r>
+                      <a:rPr>
+                        <a:latin typeface="Cambria Math" panose="02040503050406030204" pitchFamily="18" charset="0"/>
+                      </a:rPr>
+                      <m:t>25</m:t>
                     </m:r>
                   </m:oMath>
                 </a14:m>
@@ -9246,8 +9298,8 @@
           </a:p>
         </p:txBody>
       </p:sp>
-      <mc:AlternateContent xmlns:mc="http://schemas.openxmlformats.org/markup-compatibility/2006">
-        <mc:Choice xmlns:a14="http://schemas.microsoft.com/office/drawing/2010/main" Requires="a14">
+      <mc:AlternateContent xmlns:mc="http://schemas.openxmlformats.org/markup-compatibility/2006" xmlns:a14="http://schemas.microsoft.com/office/drawing/2010/main">
+        <mc:Choice Requires="a14">
           <p:sp>
             <p:nvSpPr>
               <p:cNvPr id="3" name="Content Placeholder 2"/>
@@ -9367,7 +9419,7 @@
             </p:txBody>
           </p:sp>
         </mc:Choice>
-        <mc:Fallback>
+        <mc:Fallback xmlns="">
           <p:sp>
             <p:nvSpPr>
               <p:cNvPr id="3" name="Content Placeholder 2"/>
@@ -9734,8 +9786,22 @@
           <a:lstStyle/>
           <a:p>
             <a:r>
-              <a:t>Dado de tempo até o evento</a:t>
-            </a:r>
+              <a:rPr dirty="0"/>
+              <a:t>Dado de tempo </a:t>
+            </a:r>
+            <a:r>
+              <a:rPr dirty="0" err="1"/>
+              <a:t>até</a:t>
+            </a:r>
+            <a:r>
+              <a:rPr dirty="0"/>
+              <a:t> o </a:t>
+            </a:r>
+            <a:r>
+              <a:rPr dirty="0" err="1"/>
+              <a:t>evento</a:t>
+            </a:r>
+            <a:endParaRPr dirty="0"/>
           </a:p>
         </p:txBody>
       </p:sp>
@@ -10562,8 +10628,8 @@
           </a:p>
         </p:txBody>
       </p:sp>
-      <mc:AlternateContent xmlns:mc="http://schemas.openxmlformats.org/markup-compatibility/2006">
-        <mc:Choice xmlns:a14="http://schemas.microsoft.com/office/drawing/2010/main" Requires="a14">
+      <mc:AlternateContent xmlns:mc="http://schemas.openxmlformats.org/markup-compatibility/2006" xmlns:a14="http://schemas.microsoft.com/office/drawing/2010/main">
+        <mc:Choice Requires="a14">
           <p:sp>
             <p:nvSpPr>
               <p:cNvPr id="3" name="Content Placeholder 2"/>
@@ -10973,7 +11039,7 @@
             </p:txBody>
           </p:sp>
         </mc:Choice>
-        <mc:Fallback>
+        <mc:Fallback xmlns="">
           <p:sp>
             <p:nvSpPr>
               <p:cNvPr id="3" name="Content Placeholder 2"/>
@@ -11053,8 +11119,8 @@
           </a:p>
         </p:txBody>
       </p:sp>
-      <mc:AlternateContent xmlns:mc="http://schemas.openxmlformats.org/markup-compatibility/2006">
-        <mc:Choice xmlns:a14="http://schemas.microsoft.com/office/drawing/2010/main" Requires="a14">
+      <mc:AlternateContent xmlns:mc="http://schemas.openxmlformats.org/markup-compatibility/2006" xmlns:a14="http://schemas.microsoft.com/office/drawing/2010/main">
+        <mc:Choice Requires="a14">
           <p:sp>
             <p:nvSpPr>
               <p:cNvPr id="3" name="Content Placeholder 2"/>
@@ -11567,7 +11633,7 @@
             </p:txBody>
           </p:sp>
         </mc:Choice>
-        <mc:Fallback>
+        <mc:Fallback xmlns="">
           <p:sp>
             <p:nvSpPr>
               <p:cNvPr id="3" name="Content Placeholder 2"/>
@@ -11650,18 +11716,18 @@
         <a:srgbClr val="3EBBF0"/>
       </a:folHlink>
     </a:clrScheme>
-    <a:fontScheme name="Em Tiras">
+    <a:fontScheme name="Arial Times New Roman">
       <a:majorFont>
-        <a:latin typeface="Corbel" panose="020B0503020204020204"/>
+        <a:latin typeface="Arial" panose="020B0604020202020204"/>
         <a:ea typeface=""/>
         <a:cs typeface=""/>
-        <a:font script="Jpan" typeface="ＭＳ ゴシック"/>
-        <a:font script="Hang" typeface="맑은 고딕"/>
-        <a:font script="Hans" typeface="宋体"/>
-        <a:font script="Hant" typeface="新細明體"/>
-        <a:font script="Arab" typeface="Tahoma"/>
-        <a:font script="Hebr" typeface="Gisha"/>
-        <a:font script="Thai" typeface="DilleniaUPC"/>
+        <a:font script="Jpan" typeface="ＭＳ Ｐゴシック"/>
+        <a:font script="Hang" typeface="굴림"/>
+        <a:font script="Hans" typeface="黑体"/>
+        <a:font script="Hant" typeface="微軟正黑體"/>
+        <a:font script="Arab" typeface="Arial"/>
+        <a:font script="Hebr" typeface="Arial"/>
+        <a:font script="Thai" typeface="Cordia New"/>
         <a:font script="Ethi" typeface="Nyala"/>
         <a:font script="Beng" typeface="Vrinda"/>
         <a:font script="Gujr" typeface="Shruti"/>
@@ -11682,25 +11748,25 @@
         <a:font script="Laoo" typeface="DokChampa"/>
         <a:font script="Sinh" typeface="Iskoola Pota"/>
         <a:font script="Mong" typeface="Mongolian Baiti"/>
-        <a:font script="Viet" typeface="Tahoma"/>
+        <a:font script="Viet" typeface="Arial"/>
         <a:font script="Uigh" typeface="Microsoft Uighur"/>
         <a:font script="Geor" typeface="Sylfaen"/>
       </a:majorFont>
       <a:minorFont>
-        <a:latin typeface="Corbel" panose="020B0503020204020204"/>
+        <a:latin typeface="Times New Roman" panose="02020603050405020304"/>
         <a:ea typeface=""/>
         <a:cs typeface=""/>
-        <a:font script="Jpan" typeface="ＭＳ ゴシック"/>
-        <a:font script="Hang" typeface="맑은 고딕"/>
+        <a:font script="Jpan" typeface="ＭＳ Ｐ明朝"/>
+        <a:font script="Hang" typeface="바탕"/>
         <a:font script="Hans" typeface="宋体"/>
         <a:font script="Hant" typeface="新細明體"/>
-        <a:font script="Arab" typeface="Tahoma"/>
-        <a:font script="Hebr" typeface="Gisha"/>
-        <a:font script="Thai" typeface="DilleniaUPC"/>
+        <a:font script="Arab" typeface="Times New Roman"/>
+        <a:font script="Hebr" typeface="Times New Roman"/>
+        <a:font script="Thai" typeface="Angsana New"/>
         <a:font script="Ethi" typeface="Nyala"/>
         <a:font script="Beng" typeface="Vrinda"/>
         <a:font script="Gujr" typeface="Shruti"/>
-        <a:font script="Khmr" typeface="DaunPenh"/>
+        <a:font script="Khmr" typeface="MoolBoran"/>
         <a:font script="Knda" typeface="Tunga"/>
         <a:font script="Guru" typeface="Raavi"/>
         <a:font script="Cans" typeface="Euphemia"/>
@@ -11717,7 +11783,7 @@
         <a:font script="Laoo" typeface="DokChampa"/>
         <a:font script="Sinh" typeface="Iskoola Pota"/>
         <a:font script="Mong" typeface="Mongolian Baiti"/>
-        <a:font script="Viet" typeface="Verdana"/>
+        <a:font script="Viet" typeface="Times New Roman"/>
         <a:font script="Uigh" typeface="Microsoft Uighur"/>
         <a:font script="Geor" typeface="Sylfaen"/>
       </a:minorFont>

</xml_diff>